<commit_message>
A8 P2 minor correction.
</commit_message>
<xml_diff>
--- a/Assignment-8/A-8-P-2.pptx
+++ b/Assignment-8/A-8-P-2.pptx
@@ -106,6 +106,11 @@
       </a:defRPr>
     </a:lvl9pPr>
   </p:defaultTextStyle>
+  <p:extLst>
+    <p:ext uri="{EFAFB233-063F-42B5-8137-9DF3F51BA10A}">
+      <p15:sldGuideLst xmlns:p15="http://schemas.microsoft.com/office/powerpoint/2012/main"/>
+    </p:ext>
+  </p:extLst>
 </p:presentation>
 </file>
 
@@ -342,6 +347,30 @@
       </pc:sldChg>
     </pc:docChg>
   </pc:docChgLst>
+  <pc:docChgLst>
+    <pc:chgData name="Jialin Chen" userId="0d2d9c6a-95d9-49c9-8f0f-48f042dc0890" providerId="ADAL" clId="{FD356EE2-5434-41E6-AF41-E469FB14B35C}"/>
+    <pc:docChg chg="modSld">
+      <pc:chgData name="Jialin Chen" userId="0d2d9c6a-95d9-49c9-8f0f-48f042dc0890" providerId="ADAL" clId="{FD356EE2-5434-41E6-AF41-E469FB14B35C}" dt="2020-11-22T01:43:10.826" v="21" actId="20577"/>
+      <pc:docMkLst>
+        <pc:docMk/>
+      </pc:docMkLst>
+      <pc:sldChg chg="modSp">
+        <pc:chgData name="Jialin Chen" userId="0d2d9c6a-95d9-49c9-8f0f-48f042dc0890" providerId="ADAL" clId="{FD356EE2-5434-41E6-AF41-E469FB14B35C}" dt="2020-11-22T01:43:10.826" v="21" actId="20577"/>
+        <pc:sldMkLst>
+          <pc:docMk/>
+          <pc:sldMk cId="2009130640" sldId="256"/>
+        </pc:sldMkLst>
+        <pc:graphicFrameChg chg="modGraphic">
+          <ac:chgData name="Jialin Chen" userId="0d2d9c6a-95d9-49c9-8f0f-48f042dc0890" providerId="ADAL" clId="{FD356EE2-5434-41E6-AF41-E469FB14B35C}" dt="2020-11-22T01:43:10.826" v="21" actId="20577"/>
+          <ac:graphicFrameMkLst>
+            <pc:docMk/>
+            <pc:sldMk cId="2009130640" sldId="256"/>
+            <ac:graphicFrameMk id="5" creationId="{717708D3-F1C1-4EA2-BF39-BEE5CF5BA375}"/>
+          </ac:graphicFrameMkLst>
+        </pc:graphicFrameChg>
+      </pc:sldChg>
+    </pc:docChg>
+  </pc:docChgLst>
 </pc:chgInfo>
 </file>
 
@@ -492,7 +521,7 @@
           <a:p>
             <a:fld id="{7CA6DF29-4331-4994-9C15-DA1FBD875C71}" type="datetimeFigureOut">
               <a:rPr lang="zh-CN" altLang="en-US" smtClean="0"/>
-              <a:t>2020/11/21</a:t>
+              <a:t>2020/11/22</a:t>
             </a:fld>
             <a:endParaRPr lang="zh-CN" altLang="en-US"/>
           </a:p>
@@ -690,7 +719,7 @@
           <a:p>
             <a:fld id="{7CA6DF29-4331-4994-9C15-DA1FBD875C71}" type="datetimeFigureOut">
               <a:rPr lang="zh-CN" altLang="en-US" smtClean="0"/>
-              <a:t>2020/11/21</a:t>
+              <a:t>2020/11/22</a:t>
             </a:fld>
             <a:endParaRPr lang="zh-CN" altLang="en-US"/>
           </a:p>
@@ -898,7 +927,7 @@
           <a:p>
             <a:fld id="{7CA6DF29-4331-4994-9C15-DA1FBD875C71}" type="datetimeFigureOut">
               <a:rPr lang="zh-CN" altLang="en-US" smtClean="0"/>
-              <a:t>2020/11/21</a:t>
+              <a:t>2020/11/22</a:t>
             </a:fld>
             <a:endParaRPr lang="zh-CN" altLang="en-US"/>
           </a:p>
@@ -1096,7 +1125,7 @@
           <a:p>
             <a:fld id="{7CA6DF29-4331-4994-9C15-DA1FBD875C71}" type="datetimeFigureOut">
               <a:rPr lang="zh-CN" altLang="en-US" smtClean="0"/>
-              <a:t>2020/11/21</a:t>
+              <a:t>2020/11/22</a:t>
             </a:fld>
             <a:endParaRPr lang="zh-CN" altLang="en-US"/>
           </a:p>
@@ -1371,7 +1400,7 @@
           <a:p>
             <a:fld id="{7CA6DF29-4331-4994-9C15-DA1FBD875C71}" type="datetimeFigureOut">
               <a:rPr lang="zh-CN" altLang="en-US" smtClean="0"/>
-              <a:t>2020/11/21</a:t>
+              <a:t>2020/11/22</a:t>
             </a:fld>
             <a:endParaRPr lang="zh-CN" altLang="en-US"/>
           </a:p>
@@ -1636,7 +1665,7 @@
           <a:p>
             <a:fld id="{7CA6DF29-4331-4994-9C15-DA1FBD875C71}" type="datetimeFigureOut">
               <a:rPr lang="zh-CN" altLang="en-US" smtClean="0"/>
-              <a:t>2020/11/21</a:t>
+              <a:t>2020/11/22</a:t>
             </a:fld>
             <a:endParaRPr lang="zh-CN" altLang="en-US"/>
           </a:p>
@@ -2048,7 +2077,7 @@
           <a:p>
             <a:fld id="{7CA6DF29-4331-4994-9C15-DA1FBD875C71}" type="datetimeFigureOut">
               <a:rPr lang="zh-CN" altLang="en-US" smtClean="0"/>
-              <a:t>2020/11/21</a:t>
+              <a:t>2020/11/22</a:t>
             </a:fld>
             <a:endParaRPr lang="zh-CN" altLang="en-US"/>
           </a:p>
@@ -2189,7 +2218,7 @@
           <a:p>
             <a:fld id="{7CA6DF29-4331-4994-9C15-DA1FBD875C71}" type="datetimeFigureOut">
               <a:rPr lang="zh-CN" altLang="en-US" smtClean="0"/>
-              <a:t>2020/11/21</a:t>
+              <a:t>2020/11/22</a:t>
             </a:fld>
             <a:endParaRPr lang="zh-CN" altLang="en-US"/>
           </a:p>
@@ -2302,7 +2331,7 @@
           <a:p>
             <a:fld id="{7CA6DF29-4331-4994-9C15-DA1FBD875C71}" type="datetimeFigureOut">
               <a:rPr lang="zh-CN" altLang="en-US" smtClean="0"/>
-              <a:t>2020/11/21</a:t>
+              <a:t>2020/11/22</a:t>
             </a:fld>
             <a:endParaRPr lang="zh-CN" altLang="en-US"/>
           </a:p>
@@ -2613,7 +2642,7 @@
           <a:p>
             <a:fld id="{7CA6DF29-4331-4994-9C15-DA1FBD875C71}" type="datetimeFigureOut">
               <a:rPr lang="zh-CN" altLang="en-US" smtClean="0"/>
-              <a:t>2020/11/21</a:t>
+              <a:t>2020/11/22</a:t>
             </a:fld>
             <a:endParaRPr lang="zh-CN" altLang="en-US"/>
           </a:p>
@@ -2901,7 +2930,7 @@
           <a:p>
             <a:fld id="{7CA6DF29-4331-4994-9C15-DA1FBD875C71}" type="datetimeFigureOut">
               <a:rPr lang="zh-CN" altLang="en-US" smtClean="0"/>
-              <a:t>2020/11/21</a:t>
+              <a:t>2020/11/22</a:t>
             </a:fld>
             <a:endParaRPr lang="zh-CN" altLang="en-US"/>
           </a:p>
@@ -3142,7 +3171,7 @@
           <a:p>
             <a:fld id="{7CA6DF29-4331-4994-9C15-DA1FBD875C71}" type="datetimeFigureOut">
               <a:rPr lang="zh-CN" altLang="en-US" smtClean="0"/>
-              <a:t>2020/11/21</a:t>
+              <a:t>2020/11/22</a:t>
             </a:fld>
             <a:endParaRPr lang="zh-CN" altLang="en-US"/>
           </a:p>
@@ -3576,7 +3605,7 @@
               <p:nvPr>
                 <p:extLst>
                   <p:ext uri="{D42A27DB-BD31-4B8C-83A1-F6EECF244321}">
-                    <p14:modId xmlns:p14="http://schemas.microsoft.com/office/powerpoint/2010/main" val="3666723435"/>
+                    <p14:modId xmlns:p14="http://schemas.microsoft.com/office/powerpoint/2010/main" val="2366091535"/>
                   </p:ext>
                 </p:extLst>
               </p:nvPr>
@@ -3765,7 +3794,7 @@
                           <a:pPr algn="ctr"/>
                           <a:r>
                             <a:rPr lang="en-US" altLang="zh-CN" sz="2400" dirty="0"/>
-                            <a:t>1</a:t>
+                            <a:t>0</a:t>
                           </a:r>
                           <a:endParaRPr lang="zh-CN" altLang="en-US" sz="2400" dirty="0"/>
                         </a:p>
@@ -3847,7 +3876,7 @@
                           <a:pPr algn="ctr"/>
                           <a:r>
                             <a:rPr lang="en-US" altLang="zh-CN" sz="2400" dirty="0"/>
-                            <a:t>01</a:t>
+                            <a:t>10</a:t>
                           </a:r>
                           <a:endParaRPr lang="zh-CN" altLang="en-US" sz="2400" dirty="0"/>
                         </a:p>
@@ -3929,7 +3958,7 @@
                           <a:pPr algn="ctr"/>
                           <a:r>
                             <a:rPr lang="en-US" altLang="zh-CN" sz="2400" dirty="0"/>
-                            <a:t>001</a:t>
+                            <a:t>110</a:t>
                           </a:r>
                           <a:endParaRPr lang="zh-CN" altLang="en-US" sz="2400" dirty="0"/>
                         </a:p>
@@ -4010,8 +4039,8 @@
                         <a:p>
                           <a:pPr algn="ctr"/>
                           <a:r>
-                            <a:rPr lang="en-US" altLang="zh-CN" sz="2400" dirty="0"/>
-                            <a:t>000</a:t>
+                            <a:rPr lang="en-US" altLang="zh-CN" sz="2400"/>
+                            <a:t>111</a:t>
                           </a:r>
                           <a:endParaRPr lang="zh-CN" altLang="en-US" sz="2400" dirty="0"/>
                         </a:p>
@@ -4045,7 +4074,7 @@
               <p:nvPr>
                 <p:extLst>
                   <p:ext uri="{D42A27DB-BD31-4B8C-83A1-F6EECF244321}">
-                    <p14:modId xmlns:p14="http://schemas.microsoft.com/office/powerpoint/2010/main" val="3666723435"/>
+                    <p14:modId xmlns:p14="http://schemas.microsoft.com/office/powerpoint/2010/main" val="2366091535"/>
                   </p:ext>
                 </p:extLst>
               </p:nvPr>
@@ -4178,7 +4207,7 @@
                           <a:pPr algn="ctr"/>
                           <a:r>
                             <a:rPr lang="en-US" altLang="zh-CN" sz="2400" dirty="0"/>
-                            <a:t>1</a:t>
+                            <a:t>0</a:t>
                           </a:r>
                           <a:endParaRPr lang="zh-CN" altLang="en-US" sz="2400" dirty="0"/>
                         </a:p>
@@ -4232,7 +4261,7 @@
                           <a:pPr algn="ctr"/>
                           <a:r>
                             <a:rPr lang="en-US" altLang="zh-CN" sz="2400" dirty="0"/>
-                            <a:t>01</a:t>
+                            <a:t>10</a:t>
                           </a:r>
                           <a:endParaRPr lang="zh-CN" altLang="en-US" sz="2400" dirty="0"/>
                         </a:p>
@@ -4286,7 +4315,7 @@
                           <a:pPr algn="ctr"/>
                           <a:r>
                             <a:rPr lang="en-US" altLang="zh-CN" sz="2400" dirty="0"/>
-                            <a:t>001</a:t>
+                            <a:t>110</a:t>
                           </a:r>
                           <a:endParaRPr lang="zh-CN" altLang="en-US" sz="2400" dirty="0"/>
                         </a:p>
@@ -4339,8 +4368,8 @@
                         <a:p>
                           <a:pPr algn="ctr"/>
                           <a:r>
-                            <a:rPr lang="en-US" altLang="zh-CN" sz="2400" dirty="0"/>
-                            <a:t>000</a:t>
+                            <a:rPr lang="en-US" altLang="zh-CN" sz="2400"/>
+                            <a:t>111</a:t>
                           </a:r>
                           <a:endParaRPr lang="zh-CN" altLang="en-US" sz="2400" dirty="0"/>
                         </a:p>
@@ -4587,8 +4616,8 @@
           </a:fontRef>
         </p:style>
       </p:cxnSp>
-      <mc:AlternateContent xmlns:mc="http://schemas.openxmlformats.org/markup-compatibility/2006">
-        <mc:Choice xmlns:a14="http://schemas.microsoft.com/office/drawing/2010/main" Requires="a14">
+      <mc:AlternateContent xmlns:mc="http://schemas.openxmlformats.org/markup-compatibility/2006" xmlns:a14="http://schemas.microsoft.com/office/drawing/2010/main">
+        <mc:Choice Requires="a14">
           <p:sp>
             <p:nvSpPr>
               <p:cNvPr id="16" name="文本框 15">
@@ -4617,6 +4646,7 @@
               </a:bodyPr>
               <a:lstStyle/>
               <a:p>
+                <a:pPr/>
                 <a14:m>
                   <m:oMathPara xmlns:m="http://schemas.openxmlformats.org/officeDocument/2006/math">
                     <m:oMathParaPr>
@@ -4637,7 +4667,7 @@
             </p:txBody>
           </p:sp>
         </mc:Choice>
-        <mc:Fallback>
+        <mc:Fallback xmlns="">
           <p:sp>
             <p:nvSpPr>
               <p:cNvPr id="16" name="文本框 15">
@@ -4682,8 +4712,8 @@
           </p:sp>
         </mc:Fallback>
       </mc:AlternateContent>
-      <mc:AlternateContent xmlns:mc="http://schemas.openxmlformats.org/markup-compatibility/2006">
-        <mc:Choice xmlns:a14="http://schemas.microsoft.com/office/drawing/2010/main" Requires="a14">
+      <mc:AlternateContent xmlns:mc="http://schemas.openxmlformats.org/markup-compatibility/2006" xmlns:a14="http://schemas.microsoft.com/office/drawing/2010/main">
+        <mc:Choice Requires="a14">
           <p:sp>
             <p:nvSpPr>
               <p:cNvPr id="17" name="文本框 16">
@@ -4712,6 +4742,7 @@
               </a:bodyPr>
               <a:lstStyle/>
               <a:p>
+                <a:pPr/>
                 <a14:m>
                   <m:oMathPara xmlns:m="http://schemas.openxmlformats.org/officeDocument/2006/math">
                     <m:oMathParaPr>
@@ -4751,7 +4782,7 @@
             </p:txBody>
           </p:sp>
         </mc:Choice>
-        <mc:Fallback>
+        <mc:Fallback xmlns="">
           <p:sp>
             <p:nvSpPr>
               <p:cNvPr id="17" name="文本框 16">
@@ -4796,8 +4827,8 @@
           </p:sp>
         </mc:Fallback>
       </mc:AlternateContent>
-      <mc:AlternateContent xmlns:mc="http://schemas.openxmlformats.org/markup-compatibility/2006">
-        <mc:Choice xmlns:a14="http://schemas.microsoft.com/office/drawing/2010/main" Requires="a14">
+      <mc:AlternateContent xmlns:mc="http://schemas.openxmlformats.org/markup-compatibility/2006" xmlns:a14="http://schemas.microsoft.com/office/drawing/2010/main">
+        <mc:Choice Requires="a14">
           <p:sp>
             <p:nvSpPr>
               <p:cNvPr id="18" name="文本框 17">
@@ -4826,6 +4857,7 @@
               </a:bodyPr>
               <a:lstStyle/>
               <a:p>
+                <a:pPr/>
                 <a14:m>
                   <m:oMathPara xmlns:m="http://schemas.openxmlformats.org/officeDocument/2006/math">
                     <m:oMathParaPr>
@@ -4865,7 +4897,7 @@
             </p:txBody>
           </p:sp>
         </mc:Choice>
-        <mc:Fallback>
+        <mc:Fallback xmlns="">
           <p:sp>
             <p:nvSpPr>
               <p:cNvPr id="18" name="文本框 17">
@@ -5156,8 +5188,8 @@
           <a:chExt cx="0" cy="0"/>
         </a:xfrm>
       </p:grpSpPr>
-      <mc:AlternateContent xmlns:mc="http://schemas.openxmlformats.org/markup-compatibility/2006">
-        <mc:Choice xmlns:a14="http://schemas.microsoft.com/office/drawing/2010/main" Requires="a14">
+      <mc:AlternateContent xmlns:mc="http://schemas.openxmlformats.org/markup-compatibility/2006" xmlns:a14="http://schemas.microsoft.com/office/drawing/2010/main">
+        <mc:Choice Requires="a14">
           <p:graphicFrame>
             <p:nvGraphicFramePr>
               <p:cNvPr id="5" name="表格 4">
@@ -5626,7 +5658,7 @@
             </a:graphic>
           </p:graphicFrame>
         </mc:Choice>
-        <mc:Fallback>
+        <mc:Fallback xmlns="">
           <p:graphicFrame>
             <p:nvGraphicFramePr>
               <p:cNvPr id="5" name="表格 4">
@@ -6032,8 +6064,8 @@
           </a:fontRef>
         </p:style>
       </p:cxnSp>
-      <mc:AlternateContent xmlns:mc="http://schemas.openxmlformats.org/markup-compatibility/2006">
-        <mc:Choice xmlns:a14="http://schemas.microsoft.com/office/drawing/2010/main" Requires="a14">
+      <mc:AlternateContent xmlns:mc="http://schemas.openxmlformats.org/markup-compatibility/2006" xmlns:a14="http://schemas.microsoft.com/office/drawing/2010/main">
+        <mc:Choice Requires="a14">
           <p:sp>
             <p:nvSpPr>
               <p:cNvPr id="18" name="文本框 17">
@@ -6062,6 +6094,7 @@
               </a:bodyPr>
               <a:lstStyle/>
               <a:p>
+                <a:pPr/>
                 <a14:m>
                   <m:oMathPara xmlns:m="http://schemas.openxmlformats.org/officeDocument/2006/math">
                     <m:oMathParaPr>
@@ -6101,7 +6134,7 @@
             </p:txBody>
           </p:sp>
         </mc:Choice>
-        <mc:Fallback>
+        <mc:Fallback xmlns="">
           <p:sp>
             <p:nvSpPr>
               <p:cNvPr id="18" name="文本框 17">
@@ -6294,8 +6327,8 @@
           </a:fontRef>
         </p:style>
       </p:cxnSp>
-      <mc:AlternateContent xmlns:mc="http://schemas.openxmlformats.org/markup-compatibility/2006">
-        <mc:Choice xmlns:a14="http://schemas.microsoft.com/office/drawing/2010/main" Requires="a14">
+      <mc:AlternateContent xmlns:mc="http://schemas.openxmlformats.org/markup-compatibility/2006" xmlns:a14="http://schemas.microsoft.com/office/drawing/2010/main">
+        <mc:Choice Requires="a14">
           <p:sp>
             <p:nvSpPr>
               <p:cNvPr id="27" name="文本框 26">
@@ -6324,6 +6357,7 @@
               </a:bodyPr>
               <a:lstStyle/>
               <a:p>
+                <a:pPr/>
                 <a14:m>
                   <m:oMathPara xmlns:m="http://schemas.openxmlformats.org/officeDocument/2006/math">
                     <m:oMathParaPr>
@@ -6363,7 +6397,7 @@
             </p:txBody>
           </p:sp>
         </mc:Choice>
-        <mc:Fallback>
+        <mc:Fallback xmlns="">
           <p:sp>
             <p:nvSpPr>
               <p:cNvPr id="27" name="文本框 26">
@@ -6628,8 +6662,8 @@
           </a:p>
         </p:txBody>
       </p:sp>
-      <mc:AlternateContent xmlns:mc="http://schemas.openxmlformats.org/markup-compatibility/2006">
-        <mc:Choice xmlns:a14="http://schemas.microsoft.com/office/drawing/2010/main" Requires="a14">
+      <mc:AlternateContent xmlns:mc="http://schemas.openxmlformats.org/markup-compatibility/2006" xmlns:a14="http://schemas.microsoft.com/office/drawing/2010/main">
+        <mc:Choice Requires="a14">
           <p:sp>
             <p:nvSpPr>
               <p:cNvPr id="34" name="文本框 33">
@@ -6658,6 +6692,7 @@
               </a:bodyPr>
               <a:lstStyle/>
               <a:p>
+                <a:pPr/>
                 <a14:m>
                   <m:oMathPara xmlns:m="http://schemas.openxmlformats.org/officeDocument/2006/math">
                     <m:oMathParaPr>
@@ -6678,7 +6713,7 @@
             </p:txBody>
           </p:sp>
         </mc:Choice>
-        <mc:Fallback>
+        <mc:Fallback xmlns="">
           <p:sp>
             <p:nvSpPr>
               <p:cNvPr id="34" name="文本框 33">
@@ -6753,8 +6788,8 @@
           <a:chExt cx="0" cy="0"/>
         </a:xfrm>
       </p:grpSpPr>
-      <mc:AlternateContent xmlns:mc="http://schemas.openxmlformats.org/markup-compatibility/2006">
-        <mc:Choice xmlns:a14="http://schemas.microsoft.com/office/drawing/2010/main" Requires="a14">
+      <mc:AlternateContent xmlns:mc="http://schemas.openxmlformats.org/markup-compatibility/2006" xmlns:a14="http://schemas.microsoft.com/office/drawing/2010/main">
+        <mc:Choice Requires="a14">
           <p:graphicFrame>
             <p:nvGraphicFramePr>
               <p:cNvPr id="5" name="表格 4">
@@ -7223,7 +7258,7 @@
             </a:graphic>
           </p:graphicFrame>
         </mc:Choice>
-        <mc:Fallback>
+        <mc:Fallback xmlns="">
           <p:graphicFrame>
             <p:nvGraphicFramePr>
               <p:cNvPr id="5" name="表格 4">
@@ -7862,6 +7897,15 @@
 </file>
 
 <file path=customXml/item1.xml><?xml version="1.0" encoding="utf-8"?>
+<?mso-contentType ?>
+<FormTemplates xmlns="http://schemas.microsoft.com/sharepoint/v3/contenttype/forms">
+  <Display>DocumentLibraryForm</Display>
+  <Edit>DocumentLibraryForm</Edit>
+  <New>DocumentLibraryForm</New>
+</FormTemplates>
+</file>
+
+<file path=customXml/item2.xml><?xml version="1.0" encoding="utf-8"?>
 <ct:contentTypeSchema xmlns:ct="http://schemas.microsoft.com/office/2006/metadata/contentType" xmlns:ma="http://schemas.microsoft.com/office/2006/metadata/properties/metaAttributes" ct:_="" ma:_="" ma:contentTypeName="文档" ma:contentTypeID="0x010100C2150B0F8CCF5644A8ECA3E34ABC3477" ma:contentTypeVersion="10" ma:contentTypeDescription="新建文档。" ma:contentTypeScope="" ma:versionID="f668acf972bb1054857cb2af90d48fa9">
   <xsd:schema xmlns:xsd="http://www.w3.org/2001/XMLSchema" xmlns:xs="http://www.w3.org/2001/XMLSchema" xmlns:p="http://schemas.microsoft.com/office/2006/metadata/properties" xmlns:ns3="27ab1323-0656-480a-9d23-8bcb612d2858" targetNamespace="http://schemas.microsoft.com/office/2006/metadata/properties" ma:root="true" ma:fieldsID="f67bf8471a208beb2b7f120241e2f315" ns3:_="">
     <xsd:import namespace="27ab1323-0656-480a-9d23-8bcb612d2858"/>
@@ -8045,15 +8089,6 @@
 </ct:contentTypeSchema>
 </file>
 
-<file path=customXml/item2.xml><?xml version="1.0" encoding="utf-8"?>
-<?mso-contentType ?>
-<FormTemplates xmlns="http://schemas.microsoft.com/sharepoint/v3/contenttype/forms">
-  <Display>DocumentLibraryForm</Display>
-  <Edit>DocumentLibraryForm</Edit>
-  <New>DocumentLibraryForm</New>
-</FormTemplates>
-</file>
-
 <file path=customXml/item3.xml><?xml version="1.0" encoding="utf-8"?>
 <p:properties xmlns:p="http://schemas.microsoft.com/office/2006/metadata/properties" xmlns:xsi="http://www.w3.org/2001/XMLSchema-instance" xmlns:pc="http://schemas.microsoft.com/office/infopath/2007/PartnerControls">
   <documentManagement/>
@@ -8061,6 +8096,14 @@
 </file>
 
 <file path=customXml/itemProps1.xml><?xml version="1.0" encoding="utf-8"?>
+<ds:datastoreItem xmlns:ds="http://schemas.openxmlformats.org/officeDocument/2006/customXml" ds:itemID="{BD91350C-7D0E-4D9F-84A1-8F99C83234AF}">
+  <ds:schemaRefs>
+    <ds:schemaRef ds:uri="http://schemas.microsoft.com/sharepoint/v3/contenttype/forms"/>
+  </ds:schemaRefs>
+</ds:datastoreItem>
+</file>
+
+<file path=customXml/itemProps2.xml><?xml version="1.0" encoding="utf-8"?>
 <ds:datastoreItem xmlns:ds="http://schemas.openxmlformats.org/officeDocument/2006/customXml" ds:itemID="{C4DCEDA6-2A7F-4D0E-A39F-84672E48FD51}">
   <ds:schemaRefs>
     <ds:schemaRef ds:uri="http://schemas.microsoft.com/office/2006/metadata/contentType"/>
@@ -8078,26 +8121,18 @@
 </ds:datastoreItem>
 </file>
 
-<file path=customXml/itemProps2.xml><?xml version="1.0" encoding="utf-8"?>
-<ds:datastoreItem xmlns:ds="http://schemas.openxmlformats.org/officeDocument/2006/customXml" ds:itemID="{BD91350C-7D0E-4D9F-84A1-8F99C83234AF}">
-  <ds:schemaRefs>
-    <ds:schemaRef ds:uri="http://schemas.microsoft.com/sharepoint/v3/contenttype/forms"/>
-  </ds:schemaRefs>
-</ds:datastoreItem>
-</file>
-
 <file path=customXml/itemProps3.xml><?xml version="1.0" encoding="utf-8"?>
 <ds:datastoreItem xmlns:ds="http://schemas.openxmlformats.org/officeDocument/2006/customXml" ds:itemID="{470BBD41-C67A-434A-85ED-5A6BD0185D2C}">
   <ds:schemaRefs>
+    <ds:schemaRef ds:uri="http://schemas.microsoft.com/office/infopath/2007/PartnerControls"/>
+    <ds:schemaRef ds:uri="http://schemas.openxmlformats.org/package/2006/metadata/core-properties"/>
+    <ds:schemaRef ds:uri="http://schemas.microsoft.com/office/2006/documentManagement/types"/>
+    <ds:schemaRef ds:uri="http://purl.org/dc/terms/"/>
+    <ds:schemaRef ds:uri="http://schemas.microsoft.com/office/2006/metadata/properties"/>
+    <ds:schemaRef ds:uri="http://purl.org/dc/dcmitype/"/>
     <ds:schemaRef ds:uri="27ab1323-0656-480a-9d23-8bcb612d2858"/>
+    <ds:schemaRef ds:uri="http://www.w3.org/XML/1998/namespace"/>
     <ds:schemaRef ds:uri="http://purl.org/dc/elements/1.1/"/>
-    <ds:schemaRef ds:uri="http://schemas.microsoft.com/office/2006/documentManagement/types"/>
-    <ds:schemaRef ds:uri="http://schemas.openxmlformats.org/package/2006/metadata/core-properties"/>
-    <ds:schemaRef ds:uri="http://purl.org/dc/dcmitype/"/>
-    <ds:schemaRef ds:uri="http://purl.org/dc/terms/"/>
-    <ds:schemaRef ds:uri="http://schemas.microsoft.com/office/infopath/2007/PartnerControls"/>
-    <ds:schemaRef ds:uri="http://schemas.microsoft.com/office/2006/metadata/properties"/>
-    <ds:schemaRef ds:uri="http://www.w3.org/XML/1998/namespace"/>
   </ds:schemaRefs>
 </ds:datastoreItem>
 </file>
</xml_diff>